<commit_message>
modification du powerPoint et finalisation de l'exemple
</commit_message>
<xml_diff>
--- a/Design Pattern-1.pptx
+++ b/Design Pattern-1.pptx
@@ -9,7 +9,10 @@
     <p:sldId id="257" r:id="rId3"/>
     <p:sldId id="258" r:id="rId4"/>
     <p:sldId id="259" r:id="rId5"/>
-    <p:sldId id="260" r:id="rId6"/>
+    <p:sldId id="261" r:id="rId6"/>
+    <p:sldId id="263" r:id="rId7"/>
+    <p:sldId id="262" r:id="rId8"/>
+    <p:sldId id="260" r:id="rId9"/>
   </p:sldIdLst>
   <p:sldSz cx="9144000" cy="6858000" type="screen4x3"/>
   <p:notesSz cx="6858000" cy="9144000"/>
@@ -305,7 +308,7 @@
           <a:p>
             <a:fld id="{7572C78B-13EB-4160-AF53-8615A6E62C13}" type="datetimeFigureOut">
               <a:rPr lang="fr-CH" smtClean="0"/>
-              <a:t>21.05.15</a:t>
+              <a:t>27.05.2015</a:t>
             </a:fld>
             <a:endParaRPr lang="fr-CH"/>
           </a:p>
@@ -347,7 +350,7 @@
           <a:p>
             <a:fld id="{D64FA94E-EBB3-47EF-BB79-473359CB0676}" type="slidenum">
               <a:rPr lang="fr-CH" smtClean="0"/>
-              <a:t>‹#›</a:t>
+              <a:t>‹N°›</a:t>
             </a:fld>
             <a:endParaRPr lang="fr-CH"/>
           </a:p>
@@ -470,7 +473,7 @@
           <a:p>
             <a:fld id="{7572C78B-13EB-4160-AF53-8615A6E62C13}" type="datetimeFigureOut">
               <a:rPr lang="fr-CH" smtClean="0"/>
-              <a:t>21.05.15</a:t>
+              <a:t>27.05.2015</a:t>
             </a:fld>
             <a:endParaRPr lang="fr-CH"/>
           </a:p>
@@ -512,7 +515,7 @@
           <a:p>
             <a:fld id="{D64FA94E-EBB3-47EF-BB79-473359CB0676}" type="slidenum">
               <a:rPr lang="fr-CH" smtClean="0"/>
-              <a:t>‹#›</a:t>
+              <a:t>‹N°›</a:t>
             </a:fld>
             <a:endParaRPr lang="fr-CH"/>
           </a:p>
@@ -645,7 +648,7 @@
           <a:p>
             <a:fld id="{7572C78B-13EB-4160-AF53-8615A6E62C13}" type="datetimeFigureOut">
               <a:rPr lang="fr-CH" smtClean="0"/>
-              <a:t>21.05.15</a:t>
+              <a:t>27.05.2015</a:t>
             </a:fld>
             <a:endParaRPr lang="fr-CH"/>
           </a:p>
@@ -687,7 +690,7 @@
           <a:p>
             <a:fld id="{D64FA94E-EBB3-47EF-BB79-473359CB0676}" type="slidenum">
               <a:rPr lang="fr-CH" smtClean="0"/>
-              <a:t>‹#›</a:t>
+              <a:t>‹N°›</a:t>
             </a:fld>
             <a:endParaRPr lang="fr-CH"/>
           </a:p>
@@ -810,7 +813,7 @@
           <a:p>
             <a:fld id="{7572C78B-13EB-4160-AF53-8615A6E62C13}" type="datetimeFigureOut">
               <a:rPr lang="fr-CH" smtClean="0"/>
-              <a:t>21.05.15</a:t>
+              <a:t>27.05.2015</a:t>
             </a:fld>
             <a:endParaRPr lang="fr-CH"/>
           </a:p>
@@ -852,7 +855,7 @@
           <a:p>
             <a:fld id="{D64FA94E-EBB3-47EF-BB79-473359CB0676}" type="slidenum">
               <a:rPr lang="fr-CH" smtClean="0"/>
-              <a:t>‹#›</a:t>
+              <a:t>‹N°›</a:t>
             </a:fld>
             <a:endParaRPr lang="fr-CH"/>
           </a:p>
@@ -1051,7 +1054,7 @@
           <a:p>
             <a:fld id="{7572C78B-13EB-4160-AF53-8615A6E62C13}" type="datetimeFigureOut">
               <a:rPr lang="fr-CH" smtClean="0"/>
-              <a:t>21.05.15</a:t>
+              <a:t>27.05.2015</a:t>
             </a:fld>
             <a:endParaRPr lang="fr-CH"/>
           </a:p>
@@ -1093,7 +1096,7 @@
           <a:p>
             <a:fld id="{D64FA94E-EBB3-47EF-BB79-473359CB0676}" type="slidenum">
               <a:rPr lang="fr-CH" smtClean="0"/>
-              <a:t>‹#›</a:t>
+              <a:t>‹N°›</a:t>
             </a:fld>
             <a:endParaRPr lang="fr-CH"/>
           </a:p>
@@ -1334,7 +1337,7 @@
           <a:p>
             <a:fld id="{7572C78B-13EB-4160-AF53-8615A6E62C13}" type="datetimeFigureOut">
               <a:rPr lang="fr-CH" smtClean="0"/>
-              <a:t>21.05.15</a:t>
+              <a:t>27.05.2015</a:t>
             </a:fld>
             <a:endParaRPr lang="fr-CH"/>
           </a:p>
@@ -1376,7 +1379,7 @@
           <a:p>
             <a:fld id="{D64FA94E-EBB3-47EF-BB79-473359CB0676}" type="slidenum">
               <a:rPr lang="fr-CH" smtClean="0"/>
-              <a:t>‹#›</a:t>
+              <a:t>‹N°›</a:t>
             </a:fld>
             <a:endParaRPr lang="fr-CH"/>
           </a:p>
@@ -1763,7 +1766,7 @@
           <a:p>
             <a:fld id="{7572C78B-13EB-4160-AF53-8615A6E62C13}" type="datetimeFigureOut">
               <a:rPr lang="fr-CH" smtClean="0"/>
-              <a:t>21.05.15</a:t>
+              <a:t>27.05.2015</a:t>
             </a:fld>
             <a:endParaRPr lang="fr-CH"/>
           </a:p>
@@ -1805,7 +1808,7 @@
           <a:p>
             <a:fld id="{D64FA94E-EBB3-47EF-BB79-473359CB0676}" type="slidenum">
               <a:rPr lang="fr-CH" smtClean="0"/>
-              <a:t>‹#›</a:t>
+              <a:t>‹N°›</a:t>
             </a:fld>
             <a:endParaRPr lang="fr-CH"/>
           </a:p>
@@ -1876,7 +1879,7 @@
           <a:p>
             <a:fld id="{7572C78B-13EB-4160-AF53-8615A6E62C13}" type="datetimeFigureOut">
               <a:rPr lang="fr-CH" smtClean="0"/>
-              <a:t>21.05.15</a:t>
+              <a:t>27.05.2015</a:t>
             </a:fld>
             <a:endParaRPr lang="fr-CH"/>
           </a:p>
@@ -1918,7 +1921,7 @@
           <a:p>
             <a:fld id="{D64FA94E-EBB3-47EF-BB79-473359CB0676}" type="slidenum">
               <a:rPr lang="fr-CH" smtClean="0"/>
-              <a:t>‹#›</a:t>
+              <a:t>‹N°›</a:t>
             </a:fld>
             <a:endParaRPr lang="fr-CH"/>
           </a:p>
@@ -1966,7 +1969,7 @@
           <a:p>
             <a:fld id="{7572C78B-13EB-4160-AF53-8615A6E62C13}" type="datetimeFigureOut">
               <a:rPr lang="fr-CH" smtClean="0"/>
-              <a:t>21.05.15</a:t>
+              <a:t>27.05.2015</a:t>
             </a:fld>
             <a:endParaRPr lang="fr-CH"/>
           </a:p>
@@ -2008,7 +2011,7 @@
           <a:p>
             <a:fld id="{D64FA94E-EBB3-47EF-BB79-473359CB0676}" type="slidenum">
               <a:rPr lang="fr-CH" smtClean="0"/>
-              <a:t>‹#›</a:t>
+              <a:t>‹N°›</a:t>
             </a:fld>
             <a:endParaRPr lang="fr-CH"/>
           </a:p>
@@ -2155,7 +2158,7 @@
           <a:p>
             <a:fld id="{7572C78B-13EB-4160-AF53-8615A6E62C13}" type="datetimeFigureOut">
               <a:rPr lang="fr-CH" smtClean="0"/>
-              <a:t>21.05.15</a:t>
+              <a:t>27.05.2015</a:t>
             </a:fld>
             <a:endParaRPr lang="fr-CH"/>
           </a:p>
@@ -2197,7 +2200,7 @@
           <a:p>
             <a:fld id="{D64FA94E-EBB3-47EF-BB79-473359CB0676}" type="slidenum">
               <a:rPr lang="fr-CH" smtClean="0"/>
-              <a:t>‹#›</a:t>
+              <a:t>‹N°›</a:t>
             </a:fld>
             <a:endParaRPr lang="fr-CH"/>
           </a:p>
@@ -2473,7 +2476,7 @@
           <a:p>
             <a:fld id="{7572C78B-13EB-4160-AF53-8615A6E62C13}" type="datetimeFigureOut">
               <a:rPr lang="fr-CH" smtClean="0"/>
-              <a:t>21.05.15</a:t>
+              <a:t>27.05.2015</a:t>
             </a:fld>
             <a:endParaRPr lang="fr-CH"/>
           </a:p>
@@ -2496,7 +2499,7 @@
           <a:p>
             <a:fld id="{D64FA94E-EBB3-47EF-BB79-473359CB0676}" type="slidenum">
               <a:rPr lang="fr-CH" smtClean="0"/>
-              <a:t>‹#›</a:t>
+              <a:t>‹N°›</a:t>
             </a:fld>
             <a:endParaRPr lang="fr-CH"/>
           </a:p>
@@ -2778,7 +2781,7 @@
           <a:p>
             <a:fld id="{D64FA94E-EBB3-47EF-BB79-473359CB0676}" type="slidenum">
               <a:rPr lang="fr-CH" smtClean="0"/>
-              <a:t>‹#›</a:t>
+              <a:t>‹N°›</a:t>
             </a:fld>
             <a:endParaRPr lang="fr-CH"/>
           </a:p>
@@ -2852,7 +2855,7 @@
           <a:p>
             <a:fld id="{7572C78B-13EB-4160-AF53-8615A6E62C13}" type="datetimeFigureOut">
               <a:rPr lang="fr-CH" smtClean="0"/>
-              <a:t>21.05.15</a:t>
+              <a:t>27.05.2015</a:t>
             </a:fld>
             <a:endParaRPr lang="fr-CH"/>
           </a:p>
@@ -3232,11 +3235,7 @@
           <a:p>
             <a:r>
               <a:rPr lang="fr-CH" dirty="0" smtClean="0"/>
-              <a:t>Bastian Gardel	</a:t>
-            </a:r>
-            <a:r>
-              <a:rPr lang="fr-CH" dirty="0" smtClean="0"/>
-              <a:t>Léonard Berney</a:t>
+              <a:t>Bastian Gardel	Léonard Berney</a:t>
             </a:r>
           </a:p>
           <a:p>
@@ -3258,6 +3257,13 @@
   <p:clrMapOvr>
     <a:masterClrMapping/>
   </p:clrMapOvr>
+  <p:timing>
+    <p:tnLst>
+      <p:par>
+        <p:cTn id="1" dur="indefinite" restart="never" nodeType="tmRoot"/>
+      </p:par>
+    </p:tnLst>
+  </p:timing>
 </p:sld>
 </file>
 
@@ -3380,11 +3386,7 @@
             <a:pPr lvl="1"/>
             <a:r>
               <a:rPr lang="fr-CH" dirty="0" smtClean="0"/>
-              <a:t>Ne pas violer le concept d’ouverture </a:t>
-            </a:r>
-            <a:r>
-              <a:rPr lang="fr-CH" dirty="0" smtClean="0"/>
-              <a:t>fermeture</a:t>
+              <a:t>Ne pas violer le concept d’ouverture fermeture</a:t>
             </a:r>
             <a:endParaRPr lang="fr-CH" dirty="0"/>
           </a:p>
@@ -3400,6 +3402,13 @@
   <p:clrMapOvr>
     <a:masterClrMapping/>
   </p:clrMapOvr>
+  <p:timing>
+    <p:tnLst>
+      <p:par>
+        <p:cTn id="1" dur="indefinite" restart="never" nodeType="tmRoot"/>
+      </p:par>
+    </p:tnLst>
+  </p:timing>
 </p:sld>
 </file>
 
@@ -3476,11 +3485,7 @@
             <a:pPr lvl="1"/>
             <a:r>
               <a:rPr lang="fr-CH" dirty="0" smtClean="0"/>
-              <a:t>Méthode visite</a:t>
-            </a:r>
-            <a:r>
-              <a:rPr lang="fr-CH" dirty="0" smtClean="0"/>
-              <a:t>(</a:t>
+              <a:t>Méthode visite(</a:t>
             </a:r>
             <a:r>
               <a:rPr lang="fr-CH" dirty="0"/>
@@ -3488,11 +3493,7 @@
             </a:r>
             <a:r>
               <a:rPr lang="fr-CH" dirty="0" smtClean="0"/>
-              <a:t>lasseConcrète </a:t>
-            </a:r>
-            <a:r>
-              <a:rPr lang="fr-CH" dirty="0" smtClean="0"/>
-              <a:t>c)</a:t>
+              <a:t>lasseConcrète c)</a:t>
             </a:r>
           </a:p>
           <a:p>
@@ -3544,11 +3545,7 @@
             <a:pPr lvl="1"/>
             <a:r>
               <a:rPr lang="fr-CH" dirty="0" smtClean="0"/>
-              <a:t>Méthode </a:t>
-            </a:r>
-            <a:r>
-              <a:rPr lang="fr-CH" dirty="0" smtClean="0"/>
-              <a:t>accept(</a:t>
+              <a:t>Méthode accept(</a:t>
             </a:r>
             <a:r>
               <a:rPr lang="fr-CH" dirty="0"/>
@@ -3610,7 +3607,7 @@
   <p:timing>
     <p:tnLst>
       <p:par>
-        <p:cTn xmlns:p14="http://schemas.microsoft.com/office/powerpoint/2010/main" id="1" dur="indefinite" restart="never" nodeType="tmRoot"/>
+        <p:cTn id="1" dur="indefinite" restart="never" nodeType="tmRoot"/>
       </p:par>
     </p:tnLst>
   </p:timing>
@@ -3702,7 +3699,7 @@
   <p:timing>
     <p:tnLst>
       <p:par>
-        <p:cTn xmlns:p14="http://schemas.microsoft.com/office/powerpoint/2010/main" id="1" dur="indefinite" restart="never" nodeType="tmRoot"/>
+        <p:cTn id="1" dur="indefinite" restart="never" nodeType="tmRoot"/>
       </p:par>
     </p:tnLst>
   </p:timing>
@@ -3742,6 +3739,413 @@
           <a:lstStyle/>
           <a:p>
             <a:r>
+              <a:rPr lang="fr-CH" dirty="0" smtClean="0"/>
+              <a:t>Exemple</a:t>
+            </a:r>
+            <a:endParaRPr lang="fr-CH" dirty="0"/>
+          </a:p>
+        </p:txBody>
+      </p:sp>
+      <p:sp>
+        <p:nvSpPr>
+          <p:cNvPr id="3" name="Espace réservé du contenu 2"/>
+          <p:cNvSpPr>
+            <a:spLocks noGrp="1"/>
+          </p:cNvSpPr>
+          <p:nvPr>
+            <p:ph idx="1"/>
+          </p:nvPr>
+        </p:nvSpPr>
+        <p:spPr/>
+        <p:txBody>
+          <a:bodyPr/>
+          <a:lstStyle/>
+          <a:p>
+            <a:r>
+              <a:rPr lang="fr-CH" dirty="0" smtClean="0"/>
+              <a:t>UML DE NOTRE EXEMPLE</a:t>
+            </a:r>
+            <a:endParaRPr lang="fr-CH" dirty="0"/>
+          </a:p>
+        </p:txBody>
+      </p:sp>
+    </p:spTree>
+    <p:extLst>
+      <p:ext uri="{BB962C8B-B14F-4D97-AF65-F5344CB8AC3E}">
+        <p14:creationId xmlns:p14="http://schemas.microsoft.com/office/powerpoint/2010/main" val="2542414851"/>
+      </p:ext>
+    </p:extLst>
+  </p:cSld>
+  <p:clrMapOvr>
+    <a:masterClrMapping/>
+  </p:clrMapOvr>
+</p:sld>
+</file>
+
+<file path=ppt/slides/slide6.xml><?xml version="1.0" encoding="utf-8"?>
+<p:sld xmlns:a="http://schemas.openxmlformats.org/drawingml/2006/main" xmlns:r="http://schemas.openxmlformats.org/officeDocument/2006/relationships" xmlns:p="http://schemas.openxmlformats.org/presentationml/2006/main">
+  <p:cSld>
+    <p:spTree>
+      <p:nvGrpSpPr>
+        <p:cNvPr id="1" name=""/>
+        <p:cNvGrpSpPr/>
+        <p:nvPr/>
+      </p:nvGrpSpPr>
+      <p:grpSpPr>
+        <a:xfrm>
+          <a:off x="0" y="0"/>
+          <a:ext cx="0" cy="0"/>
+          <a:chOff x="0" y="0"/>
+          <a:chExt cx="0" cy="0"/>
+        </a:xfrm>
+      </p:grpSpPr>
+      <p:sp>
+        <p:nvSpPr>
+          <p:cNvPr id="2" name="Titre 1"/>
+          <p:cNvSpPr>
+            <a:spLocks noGrp="1"/>
+          </p:cNvSpPr>
+          <p:nvPr>
+            <p:ph type="title"/>
+          </p:nvPr>
+        </p:nvSpPr>
+        <p:spPr/>
+        <p:txBody>
+          <a:bodyPr/>
+          <a:lstStyle/>
+          <a:p>
+            <a:r>
+              <a:rPr lang="fr-CH" dirty="0" smtClean="0"/>
+              <a:t>Exemple (suite)</a:t>
+            </a:r>
+            <a:endParaRPr lang="fr-CH" dirty="0"/>
+          </a:p>
+        </p:txBody>
+      </p:sp>
+      <p:sp>
+        <p:nvSpPr>
+          <p:cNvPr id="3" name="Espace réservé du contenu 2"/>
+          <p:cNvSpPr>
+            <a:spLocks noGrp="1"/>
+          </p:cNvSpPr>
+          <p:nvPr>
+            <p:ph idx="1"/>
+          </p:nvPr>
+        </p:nvSpPr>
+        <p:spPr/>
+        <p:txBody>
+          <a:bodyPr/>
+          <a:lstStyle/>
+          <a:p>
+            <a:endParaRPr lang="fr-CH" dirty="0" smtClean="0"/>
+          </a:p>
+          <a:p>
+            <a:r>
+              <a:rPr lang="fr-CH" dirty="0" smtClean="0"/>
+              <a:t>Nous créons deux </a:t>
+            </a:r>
+            <a:r>
+              <a:rPr lang="fr-CH" dirty="0" err="1" smtClean="0"/>
+              <a:t>visitor</a:t>
+            </a:r>
+            <a:r>
+              <a:rPr lang="fr-CH" dirty="0" smtClean="0"/>
+              <a:t> (</a:t>
+            </a:r>
+            <a:r>
+              <a:rPr lang="fr-CH" dirty="0" err="1" smtClean="0"/>
+              <a:t>LevelUp</a:t>
+            </a:r>
+            <a:r>
+              <a:rPr lang="fr-CH" dirty="0" smtClean="0"/>
+              <a:t> et </a:t>
+            </a:r>
+            <a:r>
+              <a:rPr lang="fr-CH" dirty="0" err="1" smtClean="0"/>
+              <a:t>SkillUP</a:t>
+            </a:r>
+            <a:r>
+              <a:rPr lang="fr-CH" dirty="0" smtClean="0"/>
+              <a:t>) ainsi qu’un visitable (Mage)</a:t>
+            </a:r>
+            <a:endParaRPr lang="fr-CH" dirty="0"/>
+          </a:p>
+          <a:p>
+            <a:endParaRPr lang="fr-CH" dirty="0" smtClean="0"/>
+          </a:p>
+          <a:p>
+            <a:endParaRPr lang="fr-CH" dirty="0"/>
+          </a:p>
+          <a:p>
+            <a:r>
+              <a:rPr lang="fr-CH" dirty="0" smtClean="0"/>
+              <a:t>Lors que une joueur gagne un niveau la méthode «</a:t>
+            </a:r>
+            <a:r>
+              <a:rPr lang="fr-CH" dirty="0" err="1" smtClean="0"/>
+              <a:t>accept</a:t>
+            </a:r>
+            <a:r>
+              <a:rPr lang="fr-CH" dirty="0" smtClean="0"/>
+              <a:t>» est appelée. </a:t>
+            </a:r>
+            <a:endParaRPr lang="fr-CH" dirty="0"/>
+          </a:p>
+        </p:txBody>
+      </p:sp>
+      <p:pic>
+        <p:nvPicPr>
+          <p:cNvPr id="2051" name="Picture 3" descr="C:\Users\Simon\Desktop\VisitableMage.png"/>
+          <p:cNvPicPr>
+            <a:picLocks noChangeAspect="1" noChangeArrowheads="1"/>
+          </p:cNvPicPr>
+          <p:nvPr/>
+        </p:nvPicPr>
+        <p:blipFill>
+          <a:blip r:embed="rId2">
+            <a:extLst>
+              <a:ext uri="{28A0092B-C50C-407E-A947-70E740481C1C}">
+                <a14:useLocalDpi xmlns:a14="http://schemas.microsoft.com/office/drawing/2010/main" val="0"/>
+              </a:ext>
+            </a:extLst>
+          </a:blip>
+          <a:srcRect/>
+          <a:stretch>
+            <a:fillRect/>
+          </a:stretch>
+        </p:blipFill>
+        <p:spPr bwMode="auto">
+          <a:xfrm>
+            <a:off x="894723" y="4365104"/>
+            <a:ext cx="4524350" cy="1869364"/>
+          </a:xfrm>
+          <a:prstGeom prst="rect">
+            <a:avLst/>
+          </a:prstGeom>
+          <a:noFill/>
+          <a:extLst>
+            <a:ext uri="{909E8E84-426E-40DD-AFC4-6F175D3DCCD1}">
+              <a14:hiddenFill xmlns:a14="http://schemas.microsoft.com/office/drawing/2010/main">
+                <a:solidFill>
+                  <a:srgbClr val="FFFFFF"/>
+                </a:solidFill>
+              </a14:hiddenFill>
+            </a:ext>
+          </a:extLst>
+        </p:spPr>
+      </p:pic>
+      <p:pic>
+        <p:nvPicPr>
+          <p:cNvPr id="2053" name="Picture 5" descr="C:\Users\Simon\Desktop\main.png"/>
+          <p:cNvPicPr>
+            <a:picLocks noChangeAspect="1" noChangeArrowheads="1"/>
+          </p:cNvPicPr>
+          <p:nvPr/>
+        </p:nvPicPr>
+        <p:blipFill>
+          <a:blip r:embed="rId3">
+            <a:extLst>
+              <a:ext uri="{28A0092B-C50C-407E-A947-70E740481C1C}">
+                <a14:useLocalDpi xmlns:a14="http://schemas.microsoft.com/office/drawing/2010/main" val="0"/>
+              </a:ext>
+            </a:extLst>
+          </a:blip>
+          <a:srcRect/>
+          <a:stretch>
+            <a:fillRect/>
+          </a:stretch>
+        </p:blipFill>
+        <p:spPr bwMode="auto">
+          <a:xfrm>
+            <a:off x="899592" y="2780928"/>
+            <a:ext cx="3816424" cy="633056"/>
+          </a:xfrm>
+          <a:prstGeom prst="rect">
+            <a:avLst/>
+          </a:prstGeom>
+          <a:noFill/>
+          <a:extLst>
+            <a:ext uri="{909E8E84-426E-40DD-AFC4-6F175D3DCCD1}">
+              <a14:hiddenFill xmlns:a14="http://schemas.microsoft.com/office/drawing/2010/main">
+                <a:solidFill>
+                  <a:srgbClr val="FFFFFF"/>
+                </a:solidFill>
+              </a14:hiddenFill>
+            </a:ext>
+          </a:extLst>
+        </p:spPr>
+      </p:pic>
+    </p:spTree>
+    <p:extLst>
+      <p:ext uri="{BB962C8B-B14F-4D97-AF65-F5344CB8AC3E}">
+        <p14:creationId xmlns:p14="http://schemas.microsoft.com/office/powerpoint/2010/main" val="2984720975"/>
+      </p:ext>
+    </p:extLst>
+  </p:cSld>
+  <p:clrMapOvr>
+    <a:masterClrMapping/>
+  </p:clrMapOvr>
+</p:sld>
+</file>
+
+<file path=ppt/slides/slide7.xml><?xml version="1.0" encoding="utf-8"?>
+<p:sld xmlns:a="http://schemas.openxmlformats.org/drawingml/2006/main" xmlns:r="http://schemas.openxmlformats.org/officeDocument/2006/relationships" xmlns:p="http://schemas.openxmlformats.org/presentationml/2006/main">
+  <p:cSld>
+    <p:spTree>
+      <p:nvGrpSpPr>
+        <p:cNvPr id="1" name=""/>
+        <p:cNvGrpSpPr/>
+        <p:nvPr/>
+      </p:nvGrpSpPr>
+      <p:grpSpPr>
+        <a:xfrm>
+          <a:off x="0" y="0"/>
+          <a:ext cx="0" cy="0"/>
+          <a:chOff x="0" y="0"/>
+          <a:chExt cx="0" cy="0"/>
+        </a:xfrm>
+      </p:grpSpPr>
+      <p:sp>
+        <p:nvSpPr>
+          <p:cNvPr id="2" name="Titre 1"/>
+          <p:cNvSpPr>
+            <a:spLocks noGrp="1"/>
+          </p:cNvSpPr>
+          <p:nvPr>
+            <p:ph type="title"/>
+          </p:nvPr>
+        </p:nvSpPr>
+        <p:spPr/>
+        <p:txBody>
+          <a:bodyPr/>
+          <a:lstStyle/>
+          <a:p>
+            <a:r>
+              <a:rPr lang="fr-CH" dirty="0" smtClean="0"/>
+              <a:t>Exemple (suite)</a:t>
+            </a:r>
+            <a:endParaRPr lang="fr-CH" dirty="0"/>
+          </a:p>
+        </p:txBody>
+      </p:sp>
+      <p:sp>
+        <p:nvSpPr>
+          <p:cNvPr id="3" name="Espace réservé du contenu 2"/>
+          <p:cNvSpPr>
+            <a:spLocks noGrp="1"/>
+          </p:cNvSpPr>
+          <p:nvPr>
+            <p:ph idx="1"/>
+          </p:nvPr>
+        </p:nvSpPr>
+        <p:spPr/>
+        <p:txBody>
+          <a:bodyPr/>
+          <a:lstStyle/>
+          <a:p>
+            <a:endParaRPr lang="fr-CH" dirty="0" smtClean="0"/>
+          </a:p>
+          <a:p>
+            <a:endParaRPr lang="fr-CH" dirty="0"/>
+          </a:p>
+          <a:p>
+            <a:pPr marL="114300" indent="0">
+              <a:buNone/>
+            </a:pPr>
+            <a:endParaRPr lang="fr-CH" dirty="0" smtClean="0"/>
+          </a:p>
+          <a:p>
+            <a:endParaRPr lang="fr-CH" dirty="0"/>
+          </a:p>
+        </p:txBody>
+      </p:sp>
+      <p:pic>
+        <p:nvPicPr>
+          <p:cNvPr id="1028" name="Picture 4" descr="C:\Users\Simon\Desktop\visitorLevelUP.png"/>
+          <p:cNvPicPr>
+            <a:picLocks noChangeAspect="1" noChangeArrowheads="1"/>
+          </p:cNvPicPr>
+          <p:nvPr/>
+        </p:nvPicPr>
+        <p:blipFill>
+          <a:blip r:embed="rId2">
+            <a:extLst>
+              <a:ext uri="{28A0092B-C50C-407E-A947-70E740481C1C}">
+                <a14:useLocalDpi xmlns:a14="http://schemas.microsoft.com/office/drawing/2010/main" val="0"/>
+              </a:ext>
+            </a:extLst>
+          </a:blip>
+          <a:srcRect/>
+          <a:stretch>
+            <a:fillRect/>
+          </a:stretch>
+        </p:blipFill>
+        <p:spPr bwMode="auto">
+          <a:xfrm>
+            <a:off x="1115616" y="1690734"/>
+            <a:ext cx="3200400" cy="4495800"/>
+          </a:xfrm>
+          <a:prstGeom prst="rect">
+            <a:avLst/>
+          </a:prstGeom>
+          <a:noFill/>
+          <a:extLst>
+            <a:ext uri="{909E8E84-426E-40DD-AFC4-6F175D3DCCD1}">
+              <a14:hiddenFill xmlns:a14="http://schemas.microsoft.com/office/drawing/2010/main">
+                <a:solidFill>
+                  <a:srgbClr val="FFFFFF"/>
+                </a:solidFill>
+              </a14:hiddenFill>
+            </a:ext>
+          </a:extLst>
+        </p:spPr>
+      </p:pic>
+    </p:spTree>
+    <p:extLst>
+      <p:ext uri="{BB962C8B-B14F-4D97-AF65-F5344CB8AC3E}">
+        <p14:creationId xmlns:p14="http://schemas.microsoft.com/office/powerpoint/2010/main" val="1494599797"/>
+      </p:ext>
+    </p:extLst>
+  </p:cSld>
+  <p:clrMapOvr>
+    <a:masterClrMapping/>
+  </p:clrMapOvr>
+</p:sld>
+</file>
+
+<file path=ppt/slides/slide8.xml><?xml version="1.0" encoding="utf-8"?>
+<p:sld xmlns:a="http://schemas.openxmlformats.org/drawingml/2006/main" xmlns:r="http://schemas.openxmlformats.org/officeDocument/2006/relationships" xmlns:p="http://schemas.openxmlformats.org/presentationml/2006/main">
+  <p:cSld>
+    <p:spTree>
+      <p:nvGrpSpPr>
+        <p:cNvPr id="1" name=""/>
+        <p:cNvGrpSpPr/>
+        <p:nvPr/>
+      </p:nvGrpSpPr>
+      <p:grpSpPr>
+        <a:xfrm>
+          <a:off x="0" y="0"/>
+          <a:ext cx="0" cy="0"/>
+          <a:chOff x="0" y="0"/>
+          <a:chExt cx="0" cy="0"/>
+        </a:xfrm>
+      </p:grpSpPr>
+      <p:sp>
+        <p:nvSpPr>
+          <p:cNvPr id="2" name="Titre 1"/>
+          <p:cNvSpPr>
+            <a:spLocks noGrp="1"/>
+          </p:cNvSpPr>
+          <p:nvPr>
+            <p:ph type="title"/>
+          </p:nvPr>
+        </p:nvSpPr>
+        <p:spPr/>
+        <p:txBody>
+          <a:bodyPr/>
+          <a:lstStyle/>
+          <a:p>
+            <a:r>
               <a:rPr lang="fr-CH" dirty="0" err="1" smtClean="0"/>
               <a:t>Visitor</a:t>
             </a:r>
@@ -3807,15 +4211,7 @@
             <a:pPr lvl="1"/>
             <a:r>
               <a:rPr lang="fr-CH" dirty="0" smtClean="0"/>
-              <a:t>Permet de travailler sur un/des objets indépendamment de la classe, utile lors du </a:t>
-            </a:r>
-            <a:r>
-              <a:rPr lang="fr-CH" dirty="0" smtClean="0"/>
-              <a:t>développement </a:t>
-            </a:r>
-            <a:r>
-              <a:rPr lang="fr-CH" dirty="0" smtClean="0"/>
-              <a:t>en équipe</a:t>
+              <a:t>Permet de travailler sur un/des objets indépendamment de la classe, utile lors du développement en équipe</a:t>
             </a:r>
           </a:p>
           <a:p>
@@ -3823,28 +4219,19 @@
               <a:rPr lang="fr-CH" dirty="0" smtClean="0"/>
               <a:t>Inconvéniant</a:t>
             </a:r>
-            <a:endParaRPr lang="fr-CH" dirty="0" smtClean="0"/>
           </a:p>
           <a:p>
             <a:pPr lvl="1"/>
             <a:r>
               <a:rPr lang="fr-CH" dirty="0" smtClean="0"/>
-              <a:t>Demande l’ajout la fonction «void </a:t>
-            </a:r>
-            <a:r>
-              <a:rPr lang="fr-CH" smtClean="0"/>
-              <a:t>visite</a:t>
-            </a:r>
-            <a:r>
-              <a:rPr lang="fr-CH" smtClean="0"/>
-              <a:t>(</a:t>
-            </a:r>
-            <a:r>
-              <a:rPr lang="fr-CH"/>
+              <a:t>Demande l’ajout la fonction «void visite(</a:t>
+            </a:r>
+            <a:r>
+              <a:rPr lang="fr-CH" dirty="0"/>
               <a:t>V</a:t>
             </a:r>
             <a:r>
-              <a:rPr lang="fr-CH" smtClean="0"/>
+              <a:rPr lang="fr-CH" dirty="0" smtClean="0"/>
               <a:t>isitable </a:t>
             </a:r>
             <a:r>
@@ -3852,20 +4239,8 @@
               <a:t>v</a:t>
             </a:r>
             <a:r>
-              <a:rPr lang="fr-CH" smtClean="0"/>
-              <a:t>)</a:t>
-            </a:r>
-            <a:r>
-              <a:rPr lang="fr-CH" dirty="0" smtClean="0"/>
-              <a:t>» si on veux visiter un </a:t>
-            </a:r>
-            <a:r>
-              <a:rPr lang="fr-CH" dirty="0" smtClean="0"/>
-              <a:t>nouvel </a:t>
-            </a:r>
-            <a:r>
-              <a:rPr lang="fr-CH" dirty="0" smtClean="0"/>
-              <a:t>objet -&gt; maintient du code</a:t>
+              <a:rPr lang="fr-CH" dirty="0" smtClean="0"/>
+              <a:t>)» si on veux visiter un nouvel objet -&gt; maintient du code</a:t>
             </a:r>
             <a:endParaRPr lang="fr-CH" dirty="0"/>
           </a:p>
@@ -3884,7 +4259,7 @@
   <p:timing>
     <p:tnLst>
       <p:par>
-        <p:cTn xmlns:p14="http://schemas.microsoft.com/office/powerpoint/2010/main" id="1" dur="indefinite" restart="never" nodeType="tmRoot"/>
+        <p:cTn id="1" dur="indefinite" restart="never" nodeType="tmRoot"/>
       </p:par>
     </p:tnLst>
   </p:timing>

</xml_diff>